<commit_message>
commit after updating the final report and ppt based on mentor feedback
</commit_message>
<xml_diff>
--- a/Report/[Mehdi Salehi] Capstone Two Summary Presentation.pptx
+++ b/Report/[Mehdi Salehi] Capstone Two Summary Presentation.pptx
@@ -13255,7 +13255,7 @@
             <a:tbl>
               <a:tblPr>
                 <a:noFill/>
-                <a:tableStyleId>{F5ADD757-404F-47C9-A456-CB3D17E7DC2D}</a:tableStyleId>
+                <a:tableStyleId>{5FCD49C6-039F-4206-9FCE-AC9038F36672}</a:tableStyleId>
               </a:tblPr>
               <a:tblGrid>
                 <a:gridCol w="3105825"/>
@@ -16117,7 +16117,154 @@
                   <a:schemeClr val="lt1"/>
                 </a:solidFill>
               </a:rPr>
-              <a:t>n_estimators = 1800 max_depth = 20</a:t>
+              <a:t>n_estimators = 1800 max_depth =</a:t>
+            </a:r>
+            <a:r>
+              <a:rPr lang="en" sz="1600">
+                <a:solidFill>
+                  <a:schemeClr val="lt1"/>
+                </a:solidFill>
+              </a:rPr>
+              <a:t>Base Model:  </a:t>
+            </a:r>
+            <a:endParaRPr sz="1600">
+              <a:solidFill>
+                <a:schemeClr val="lt1"/>
+              </a:solidFill>
+            </a:endParaRPr>
+          </a:p>
+          <a:p>
+            <a:pPr indent="0" lvl="0" marL="0" rtl="0" algn="l">
+              <a:spcBef>
+                <a:spcPts val="0"/>
+              </a:spcBef>
+              <a:spcAft>
+                <a:spcPts val="0"/>
+              </a:spcAft>
+              <a:buNone/>
+            </a:pPr>
+            <a:r>
+              <a:rPr lang="en" sz="1600">
+                <a:solidFill>
+                  <a:schemeClr val="lt1"/>
+                </a:solidFill>
+              </a:rPr>
+              <a:t>n_estimators = 100</a:t>
+            </a:r>
+            <a:endParaRPr sz="1600">
+              <a:solidFill>
+                <a:schemeClr val="lt1"/>
+              </a:solidFill>
+            </a:endParaRPr>
+          </a:p>
+          <a:p>
+            <a:pPr indent="0" lvl="0" marL="0" rtl="0" algn="l">
+              <a:spcBef>
+                <a:spcPts val="0"/>
+              </a:spcBef>
+              <a:spcAft>
+                <a:spcPts val="0"/>
+              </a:spcAft>
+              <a:buNone/>
+            </a:pPr>
+            <a:r>
+              <a:rPr lang="en" sz="1600">
+                <a:solidFill>
+                  <a:schemeClr val="lt1"/>
+                </a:solidFill>
+              </a:rPr>
+              <a:t>max_depth = 6 learning_rate = 0.3</a:t>
+            </a:r>
+            <a:endParaRPr sz="1600">
+              <a:solidFill>
+                <a:schemeClr val="lt1"/>
+              </a:solidFill>
+            </a:endParaRPr>
+          </a:p>
+          <a:p>
+            <a:pPr indent="0" lvl="0" marL="0" rtl="0" algn="l">
+              <a:spcBef>
+                <a:spcPts val="0"/>
+              </a:spcBef>
+              <a:spcAft>
+                <a:spcPts val="0"/>
+              </a:spcAft>
+              <a:buNone/>
+            </a:pPr>
+            <a:r>
+              <a:rPr lang="en" sz="1600">
+                <a:solidFill>
+                  <a:schemeClr val="lt1"/>
+                </a:solidFill>
+              </a:rPr>
+              <a:t>colsample_bytree = 1</a:t>
+            </a:r>
+            <a:endParaRPr sz="1600">
+              <a:solidFill>
+                <a:schemeClr val="lt1"/>
+              </a:solidFill>
+            </a:endParaRPr>
+          </a:p>
+          <a:p>
+            <a:pPr indent="0" lvl="0" marL="0" rtl="0" algn="l">
+              <a:spcBef>
+                <a:spcPts val="0"/>
+              </a:spcBef>
+              <a:spcAft>
+                <a:spcPts val="0"/>
+              </a:spcAft>
+              <a:buNone/>
+            </a:pPr>
+            <a:r>
+              <a:rPr lang="en" sz="1600">
+                <a:solidFill>
+                  <a:schemeClr val="lt1"/>
+                </a:solidFill>
+              </a:rPr>
+              <a:t>colsample_bylevel = 1</a:t>
+            </a:r>
+            <a:endParaRPr sz="1600">
+              <a:solidFill>
+                <a:schemeClr val="lt1"/>
+              </a:solidFill>
+            </a:endParaRPr>
+          </a:p>
+          <a:p>
+            <a:pPr indent="0" lvl="0" marL="0" rtl="0" algn="l">
+              <a:spcBef>
+                <a:spcPts val="0"/>
+              </a:spcBef>
+              <a:spcAft>
+                <a:spcPts val="0"/>
+              </a:spcAft>
+              <a:buNone/>
+            </a:pPr>
+            <a:r>
+              <a:t/>
+            </a:r>
+            <a:endParaRPr sz="1600">
+              <a:solidFill>
+                <a:schemeClr val="lt1"/>
+              </a:solidFill>
+            </a:endParaRPr>
+          </a:p>
+          <a:p>
+            <a:pPr indent="0" lvl="0" marL="0" rtl="0" algn="l">
+              <a:spcBef>
+                <a:spcPts val="0"/>
+              </a:spcBef>
+              <a:spcAft>
+                <a:spcPts val="0"/>
+              </a:spcAft>
+              <a:buNone/>
+            </a:pPr>
+            <a:r>
+              <a:rPr lang="en" sz="1600">
+                <a:solidFill>
+                  <a:schemeClr val="lt1"/>
+                </a:solidFill>
+              </a:rPr>
+              <a:t> 20</a:t>
             </a:r>
             <a:endParaRPr sz="1600">
               <a:solidFill>
@@ -16718,7 +16865,7 @@
                   <a:schemeClr val="lt1"/>
                 </a:solidFill>
               </a:rPr>
-              <a:t>For example, how installing a humidifier or dehumidifier in a house will affect energy consumption (increase or decrease in humidity)</a:t>
+              <a:t>Installing a humidifier </a:t>
             </a:r>
             <a:endParaRPr sz="1650">
               <a:solidFill>
@@ -16749,7 +16896,7 @@
                   <a:schemeClr val="lt1"/>
                 </a:solidFill>
               </a:rPr>
-              <a:t>How the orientation of the house (facing north or south) will affect the energy consumption </a:t>
+              <a:t>Orientation of the house (north or south) </a:t>
             </a:r>
             <a:endParaRPr sz="1650">
               <a:solidFill>
@@ -16780,7 +16927,29 @@
                   <a:schemeClr val="lt1"/>
                 </a:solidFill>
               </a:rPr>
-              <a:t>Model can also be used in combination with weather forecasts to predict the possible increases or decreases in energy loads, especially when considering more than one individual household in a neighborhood or zip code, or even a city to scale the process</a:t>
+              <a:t>Weather forecasts to predict energy loads,</a:t>
+            </a:r>
+            <a:endParaRPr sz="1650">
+              <a:solidFill>
+                <a:schemeClr val="lt1"/>
+              </a:solidFill>
+            </a:endParaRPr>
+          </a:p>
+          <a:p>
+            <a:pPr indent="0" lvl="0" marL="0" rtl="0" algn="just">
+              <a:lnSpc>
+                <a:spcPct val="115000"/>
+              </a:lnSpc>
+              <a:spcBef>
+                <a:spcPts val="0"/>
+              </a:spcBef>
+              <a:spcAft>
+                <a:spcPts val="0"/>
+              </a:spcAft>
+              <a:buNone/>
+            </a:pPr>
+            <a:r>
+              <a:t/>
             </a:r>
             <a:endParaRPr sz="1650">
               <a:solidFill>

</xml_diff>

<commit_message>
commit after uploading final report and presentation
</commit_message>
<xml_diff>
--- a/Report/[Mehdi Salehi] Capstone Two Summary Presentation.pptx
+++ b/Report/[Mehdi Salehi] Capstone Two Summary Presentation.pptx
@@ -10825,11 +10825,8 @@
           <a:lstStyle/>
           <a:p>
             <a:pPr indent="0" lvl="0" marL="0" rtl="0" algn="ctr">
-              <a:lnSpc>
-                <a:spcPct val="115000"/>
-              </a:lnSpc>
-              <a:spcBef>
-                <a:spcPts val="0"/>
+              <a:spcBef>
+                <a:spcPts val="400"/>
               </a:spcBef>
               <a:spcAft>
                 <a:spcPts val="0"/>
@@ -10838,7 +10835,11 @@
             </a:pPr>
             <a:r>
               <a:rPr lang="en" sz="3300"/>
-              <a:t>Appliances’ Energy Consumption Prediction Based on House Temperature and Humidity Conditions and Meteorological Variables</a:t>
+              <a:t>    </a:t>
+            </a:r>
+            <a:r>
+              <a:rPr lang="en" sz="3300"/>
+              <a:t>Using Machine Learning to Predict Household Appliance Energy Consumption Based on Temperature and Humidity Conditions and Meteorological Variables</a:t>
             </a:r>
             <a:endParaRPr sz="3300"/>
           </a:p>
@@ -10848,7 +10849,7 @@
                 <a:spcPct val="115000"/>
               </a:lnSpc>
               <a:spcBef>
-                <a:spcPts val="300"/>
+                <a:spcPts val="0"/>
               </a:spcBef>
               <a:spcAft>
                 <a:spcPts val="0"/>
@@ -10858,7 +10859,7 @@
             <a:r>
               <a:t/>
             </a:r>
-            <a:endParaRPr sz="3400"/>
+            <a:endParaRPr sz="3300"/>
           </a:p>
           <a:p>
             <a:pPr indent="0" lvl="0" marL="0" rtl="0" algn="ctr">
@@ -13255,7 +13256,7 @@
             <a:tbl>
               <a:tblPr>
                 <a:noFill/>
-                <a:tableStyleId>{5FCD49C6-039F-4206-9FCE-AC9038F36672}</a:tableStyleId>
+                <a:tableStyleId>{20F454AE-845A-4290-B34B-A08AF8ED545F}</a:tableStyleId>
               </a:tblPr>
               <a:tblGrid>
                 <a:gridCol w="3105825"/>

</xml_diff>